<commit_message>
Edited SPI part 2 ppt class 18
</commit_message>
<xml_diff>
--- a/Presentations/AVR Live Class 18.pptx
+++ b/Presentations/AVR Live Class 18.pptx
@@ -31,7 +31,7 @@
     <p:sldId id="324" r:id="rId22"/>
     <p:sldId id="325" r:id="rId23"/>
     <p:sldId id="326" r:id="rId24"/>
-    <p:sldId id="327" r:id="rId25"/>
+    <p:sldId id="328" r:id="rId25"/>
     <p:sldId id="264" r:id="rId26"/>
   </p:sldIdLst>
   <p:sldSz cx="9144000" cy="5143500" type="screen16x9"/>
@@ -306,7 +306,7 @@
 <file path=ppt/revisionInfo.xml><?xml version="1.0" encoding="utf-8"?>
 <p1510:revInfo xmlns:a="http://schemas.openxmlformats.org/drawingml/2006/main" xmlns:r="http://schemas.openxmlformats.org/officeDocument/2006/relationships" xmlns:p1510="http://schemas.microsoft.com/office/powerpoint/2015/10/main">
   <p1510:revLst>
-    <p1510:client id="{F1E12AC8-1770-4604-B6AB-463DAB463819}" v="24" dt="2025-10-31T14:03:52.989"/>
+    <p1510:client id="{F1E12AC8-1770-4604-B6AB-463DAB463819}" v="25" dt="2025-10-31T14:16:50.725"/>
   </p1510:revLst>
 </p1510:revInfo>
 </file>
@@ -316,7 +316,7 @@
   <pc:docChgLst>
     <pc:chgData name="Sreejith Rajan" userId="ec11bca0e4bee75f" providerId="LiveId" clId="{7B4F392D-EAB3-4CE7-903E-F84869825F47}"/>
     <pc:docChg chg="undo custSel addSld delSld modSld sldOrd">
-      <pc:chgData name="Sreejith Rajan" userId="ec11bca0e4bee75f" providerId="LiveId" clId="{7B4F392D-EAB3-4CE7-903E-F84869825F47}" dt="2025-10-31T14:11:54.921" v="6644" actId="20577"/>
+      <pc:chgData name="Sreejith Rajan" userId="ec11bca0e4bee75f" providerId="LiveId" clId="{7B4F392D-EAB3-4CE7-903E-F84869825F47}" dt="2025-10-31T14:16:53.541" v="6651" actId="47"/>
       <pc:docMkLst>
         <pc:docMk/>
       </pc:docMkLst>
@@ -1199,8 +1199,8 @@
           </ac:graphicFrameMkLst>
         </pc:graphicFrameChg>
       </pc:sldChg>
-      <pc:sldChg chg="delSp modSp add mod">
-        <pc:chgData name="Sreejith Rajan" userId="ec11bca0e4bee75f" providerId="LiveId" clId="{7B4F392D-EAB3-4CE7-903E-F84869825F47}" dt="2025-10-31T14:11:54.921" v="6644" actId="20577"/>
+      <pc:sldChg chg="delSp modSp add del mod">
+        <pc:chgData name="Sreejith Rajan" userId="ec11bca0e4bee75f" providerId="LiveId" clId="{7B4F392D-EAB3-4CE7-903E-F84869825F47}" dt="2025-10-31T14:16:53.541" v="6651" actId="47"/>
         <pc:sldMkLst>
           <pc:docMk/>
           <pc:sldMk cId="1759038431" sldId="327"/>
@@ -1221,6 +1221,21 @@
             <ac:graphicFrameMk id="5" creationId="{17A11732-F755-7F53-A156-62305B48BB1E}"/>
           </ac:graphicFrameMkLst>
         </pc:graphicFrameChg>
+      </pc:sldChg>
+      <pc:sldChg chg="modSp add ord">
+        <pc:chgData name="Sreejith Rajan" userId="ec11bca0e4bee75f" providerId="LiveId" clId="{7B4F392D-EAB3-4CE7-903E-F84869825F47}" dt="2025-10-31T14:16:50.725" v="6650"/>
+        <pc:sldMkLst>
+          <pc:docMk/>
+          <pc:sldMk cId="1648205850" sldId="328"/>
+        </pc:sldMkLst>
+        <pc:spChg chg="mod">
+          <ac:chgData name="Sreejith Rajan" userId="ec11bca0e4bee75f" providerId="LiveId" clId="{7B4F392D-EAB3-4CE7-903E-F84869825F47}" dt="2025-10-31T14:16:50.725" v="6650"/>
+          <ac:spMkLst>
+            <pc:docMk/>
+            <pc:sldMk cId="1648205850" sldId="328"/>
+            <ac:spMk id="3" creationId="{7243A1EB-5DB1-D18F-A89F-E2FBC51A8E3D}"/>
+          </ac:spMkLst>
+        </pc:spChg>
       </pc:sldChg>
       <pc:sldMasterChg chg="delSldLayout">
         <pc:chgData name="Sreejith Rajan" userId="ec11bca0e4bee75f" providerId="LiveId" clId="{7B4F392D-EAB3-4CE7-903E-F84869825F47}" dt="2025-09-26T13:36:35.786" v="1820" actId="47"/>
@@ -14756,7 +14771,7 @@
         <p:cNvPr id="1" name="">
           <a:extLst>
             <a:ext uri="{FF2B5EF4-FFF2-40B4-BE49-F238E27FC236}">
-              <a16:creationId xmlns:a16="http://schemas.microsoft.com/office/drawing/2014/main" id="{A05B619E-BDD7-6420-E3F5-9AA91FE6CCBB}"/>
+              <a16:creationId xmlns:a16="http://schemas.microsoft.com/office/drawing/2014/main" id="{EAE1F803-9E6B-4D6B-A40B-6320CC8B3A98}"/>
             </a:ext>
           </a:extLst>
         </p:cNvPr>
@@ -14773,10 +14788,53 @@
       </p:grpSpPr>
       <p:sp>
         <p:nvSpPr>
+          <p:cNvPr id="2" name="Text Placeholder 1">
+            <a:extLst>
+              <a:ext uri="{FF2B5EF4-FFF2-40B4-BE49-F238E27FC236}">
+                <a16:creationId xmlns:a16="http://schemas.microsoft.com/office/drawing/2014/main" id="{F27A24CD-8767-C553-9578-7532FF60013F}"/>
+              </a:ext>
+            </a:extLst>
+          </p:cNvPr>
+          <p:cNvSpPr>
+            <a:spLocks noGrp="1"/>
+          </p:cNvSpPr>
+          <p:nvPr>
+            <p:ph type="body" idx="1"/>
+          </p:nvPr>
+        </p:nvSpPr>
+        <p:spPr>
+          <a:xfrm>
+            <a:off x="2698250" y="867478"/>
+            <a:ext cx="5905500" cy="3908922"/>
+          </a:xfrm>
+        </p:spPr>
+        <p:txBody>
+          <a:bodyPr/>
+          <a:lstStyle/>
+          <a:p>
+            <a:r>
+              <a:rPr lang="en-US" dirty="0"/>
+              <a:t>SPI (Serial Peripheral Interface) is a synchronous serial communication protocol used to connect a microcontroller (Master) with one or more peripheral devices (Slaves) such as sensors, displays, and memory chips.</a:t>
+            </a:r>
+          </a:p>
+          <a:p>
+            <a:endParaRPr lang="en-US" dirty="0"/>
+          </a:p>
+          <a:p>
+            <a:r>
+              <a:rPr lang="en-US" dirty="0"/>
+              <a:t>It was developed by Motorola and is widely used in embedded systems because it is fast, simple, and full-duplex (data can be sent and received at the same time).</a:t>
+            </a:r>
+            <a:endParaRPr lang="en-IN" dirty="0"/>
+          </a:p>
+        </p:txBody>
+      </p:sp>
+      <p:sp>
+        <p:nvSpPr>
           <p:cNvPr id="3" name="Title 2">
             <a:extLst>
               <a:ext uri="{FF2B5EF4-FFF2-40B4-BE49-F238E27FC236}">
-                <a16:creationId xmlns:a16="http://schemas.microsoft.com/office/drawing/2014/main" id="{25DC2FE0-D450-DCC7-AB0A-1B9BAEBB71BE}"/>
+                <a16:creationId xmlns:a16="http://schemas.microsoft.com/office/drawing/2014/main" id="{7243A1EB-5DB1-D18F-A89F-E2FBC51A8E3D}"/>
               </a:ext>
             </a:extLst>
           </p:cNvPr>
@@ -14805,7 +14863,7 @@
     </p:spTree>
     <p:extLst>
       <p:ext uri="{BB962C8B-B14F-4D97-AF65-F5344CB8AC3E}">
-        <p14:creationId xmlns:p14="http://schemas.microsoft.com/office/powerpoint/2010/main" val="1759038431"/>
+        <p14:creationId xmlns:p14="http://schemas.microsoft.com/office/powerpoint/2010/main" val="1648205850"/>
       </p:ext>
     </p:extLst>
   </p:cSld>

</xml_diff>

<commit_message>
Added Class 19 ppt
</commit_message>
<xml_diff>
--- a/Presentations/AVR Live Class 18.pptx
+++ b/Presentations/AVR Live Class 18.pptx
@@ -306,7 +306,7 @@
 <file path=ppt/revisionInfo.xml><?xml version="1.0" encoding="utf-8"?>
 <p1510:revInfo xmlns:a="http://schemas.openxmlformats.org/drawingml/2006/main" xmlns:r="http://schemas.openxmlformats.org/officeDocument/2006/relationships" xmlns:p1510="http://schemas.microsoft.com/office/powerpoint/2015/10/main">
   <p1510:revLst>
-    <p1510:client id="{F1E12AC8-1770-4604-B6AB-463DAB463819}" v="25" dt="2025-10-31T14:16:50.725"/>
+    <p1510:client id="{F1E12AC8-1770-4604-B6AB-463DAB463819}" v="31" dt="2025-10-31T15:58:31.289"/>
   </p1510:revLst>
 </p1510:revInfo>
 </file>
@@ -316,7 +316,7 @@
   <pc:docChgLst>
     <pc:chgData name="Sreejith Rajan" userId="ec11bca0e4bee75f" providerId="LiveId" clId="{7B4F392D-EAB3-4CE7-903E-F84869825F47}"/>
     <pc:docChg chg="undo custSel addSld delSld modSld sldOrd">
-      <pc:chgData name="Sreejith Rajan" userId="ec11bca0e4bee75f" providerId="LiveId" clId="{7B4F392D-EAB3-4CE7-903E-F84869825F47}" dt="2025-10-31T14:18:25.378" v="6653" actId="5793"/>
+      <pc:chgData name="Sreejith Rajan" userId="ec11bca0e4bee75f" providerId="LiveId" clId="{7B4F392D-EAB3-4CE7-903E-F84869825F47}" dt="2025-10-31T16:07:30.255" v="6831" actId="20577"/>
       <pc:docMkLst>
         <pc:docMk/>
       </pc:docMkLst>
@@ -1098,7 +1098,7 @@
         </pc:graphicFrameChg>
       </pc:sldChg>
       <pc:sldChg chg="addSp delSp modSp add mod">
-        <pc:chgData name="Sreejith Rajan" userId="ec11bca0e4bee75f" providerId="LiveId" clId="{7B4F392D-EAB3-4CE7-903E-F84869825F47}" dt="2025-10-31T14:01:34.975" v="6587" actId="1076"/>
+        <pc:chgData name="Sreejith Rajan" userId="ec11bca0e4bee75f" providerId="LiveId" clId="{7B4F392D-EAB3-4CE7-903E-F84869825F47}" dt="2025-10-31T15:23:07.593" v="6654" actId="14100"/>
         <pc:sldMkLst>
           <pc:docMk/>
           <pc:sldMk cId="2256820275" sldId="325"/>
@@ -1128,7 +1128,7 @@
           </ac:spMkLst>
         </pc:spChg>
         <pc:spChg chg="add mod">
-          <ac:chgData name="Sreejith Rajan" userId="ec11bca0e4bee75f" providerId="LiveId" clId="{7B4F392D-EAB3-4CE7-903E-F84869825F47}" dt="2025-10-31T14:01:34.975" v="6587" actId="1076"/>
+          <ac:chgData name="Sreejith Rajan" userId="ec11bca0e4bee75f" providerId="LiveId" clId="{7B4F392D-EAB3-4CE7-903E-F84869825F47}" dt="2025-10-31T15:23:07.593" v="6654" actId="14100"/>
           <ac:spMkLst>
             <pc:docMk/>
             <pc:sldMk cId="2256820275" sldId="325"/>
@@ -1223,13 +1223,13 @@
         </pc:graphicFrameChg>
       </pc:sldChg>
       <pc:sldChg chg="modSp add mod ord">
-        <pc:chgData name="Sreejith Rajan" userId="ec11bca0e4bee75f" providerId="LiveId" clId="{7B4F392D-EAB3-4CE7-903E-F84869825F47}" dt="2025-10-31T14:18:25.378" v="6653" actId="5793"/>
+        <pc:chgData name="Sreejith Rajan" userId="ec11bca0e4bee75f" providerId="LiveId" clId="{7B4F392D-EAB3-4CE7-903E-F84869825F47}" dt="2025-10-31T16:07:30.255" v="6831" actId="20577"/>
         <pc:sldMkLst>
           <pc:docMk/>
           <pc:sldMk cId="1648205850" sldId="328"/>
         </pc:sldMkLst>
         <pc:spChg chg="mod">
-          <ac:chgData name="Sreejith Rajan" userId="ec11bca0e4bee75f" providerId="LiveId" clId="{7B4F392D-EAB3-4CE7-903E-F84869825F47}" dt="2025-10-31T14:18:25.378" v="6653" actId="5793"/>
+          <ac:chgData name="Sreejith Rajan" userId="ec11bca0e4bee75f" providerId="LiveId" clId="{7B4F392D-EAB3-4CE7-903E-F84869825F47}" dt="2025-10-31T16:07:30.255" v="6831" actId="20577"/>
           <ac:spMkLst>
             <pc:docMk/>
             <pc:sldMk cId="1648205850" sldId="328"/>
@@ -13347,7 +13347,7 @@
         <p:spPr>
           <a:xfrm>
             <a:off x="2791890" y="2905770"/>
-            <a:ext cx="2784737" cy="523220"/>
+            <a:ext cx="5431271" cy="523220"/>
           </a:xfrm>
           <a:prstGeom prst="rect">
             <a:avLst/>
@@ -13355,7 +13355,7 @@
           <a:noFill/>
         </p:spPr>
         <p:txBody>
-          <a:bodyPr wrap="none" rtlCol="0">
+          <a:bodyPr wrap="square" rtlCol="0">
             <a:spAutoFit/>
           </a:bodyPr>
           <a:lstStyle/>
@@ -13705,7 +13705,7 @@
                         <a:buNone/>
                       </a:pPr>
                       <a:r>
-                        <a:rPr lang="en-IN" sz="1300"/>
+                        <a:rPr lang="en-IN" sz="1300" dirty="0"/>
                         <a:t>Chip ID</a:t>
                       </a:r>
                     </a:p>
@@ -13759,12 +13759,12 @@
                         <a:buNone/>
                       </a:pPr>
                       <a:r>
-                        <a:rPr lang="en-IN" sz="1300">
+                        <a:rPr lang="en-IN" sz="1300" dirty="0">
                           <a:latin typeface="Courier New" panose="02070309020205020404" pitchFamily="49" charset="0"/>
                         </a:rPr>
                         <a:t>0xD0</a:t>
                       </a:r>
-                      <a:endParaRPr lang="en-IN" sz="1300"/>
+                      <a:endParaRPr lang="en-IN" sz="1300" dirty="0"/>
                     </a:p>
                   </a:txBody>
                   <a:tcPr marL="86125" marR="86125" marT="43063" marB="43063" anchor="ctr">
@@ -13816,16 +13816,16 @@
                         <a:buNone/>
                       </a:pPr>
                       <a:r>
-                        <a:rPr lang="en-IN" sz="1300"/>
+                        <a:rPr lang="en-IN" sz="1300" dirty="0"/>
                         <a:t>Read-only, fixed value </a:t>
                       </a:r>
                       <a:r>
-                        <a:rPr lang="en-IN" sz="1300">
+                        <a:rPr lang="en-IN" sz="1300" dirty="0">
                           <a:latin typeface="Courier New" panose="02070309020205020404" pitchFamily="49" charset="0"/>
                         </a:rPr>
                         <a:t>0x58</a:t>
                       </a:r>
-                      <a:endParaRPr lang="en-IN" sz="1300"/>
+                      <a:endParaRPr lang="en-IN" sz="1300" dirty="0"/>
                     </a:p>
                   </a:txBody>
                   <a:tcPr marL="86125" marR="86125" marT="43063" marB="43063" anchor="ctr">
@@ -14349,7 +14349,7 @@
                         <a:buNone/>
                       </a:pPr>
                       <a:r>
-                        <a:rPr lang="en-US" sz="1300"/>
+                        <a:rPr lang="en-US" sz="1300" dirty="0"/>
                         <a:t>Controls oversampling and power mode</a:t>
                       </a:r>
                     </a:p>
@@ -14521,7 +14521,7 @@
                         <a:buNone/>
                       </a:pPr>
                       <a:r>
-                        <a:rPr lang="en-IN" sz="1300"/>
+                        <a:rPr lang="en-IN" sz="1300" dirty="0"/>
                         <a:t>Filter and standby settings</a:t>
                       </a:r>
                     </a:p>
@@ -14582,7 +14582,7 @@
                         <a:buNone/>
                       </a:pPr>
                       <a:r>
-                        <a:rPr lang="en-IN" sz="1300"/>
+                        <a:rPr lang="en-IN" sz="1300" dirty="0"/>
                         <a:t>Data registers</a:t>
                       </a:r>
                     </a:p>
@@ -14636,22 +14636,22 @@
                         <a:buNone/>
                       </a:pPr>
                       <a:r>
-                        <a:rPr lang="en-IN" sz="1300">
+                        <a:rPr lang="en-IN" sz="1300" dirty="0">
                           <a:latin typeface="Courier New" panose="02070309020205020404" pitchFamily="49" charset="0"/>
                         </a:rPr>
                         <a:t>0xF7</a:t>
                       </a:r>
                       <a:r>
-                        <a:rPr lang="en-IN" sz="1300"/>
+                        <a:rPr lang="en-IN" sz="1300" dirty="0"/>
                         <a:t>–</a:t>
                       </a:r>
                       <a:r>
-                        <a:rPr lang="en-IN" sz="1300">
+                        <a:rPr lang="en-IN" sz="1300" dirty="0">
                           <a:latin typeface="Courier New" panose="02070309020205020404" pitchFamily="49" charset="0"/>
                         </a:rPr>
                         <a:t>0xFC</a:t>
                       </a:r>
-                      <a:endParaRPr lang="en-IN" sz="1300"/>
+                      <a:endParaRPr lang="en-IN" sz="1300" dirty="0"/>
                     </a:p>
                   </a:txBody>
                   <a:tcPr marL="86125" marR="86125" marT="43063" marB="43063" anchor="ctr">
@@ -14817,8 +14817,211 @@
           </a:xfrm>
         </p:spPr>
         <p:txBody>
-          <a:bodyPr/>
+          <a:bodyPr>
+            <a:normAutofit fontScale="70000" lnSpcReduction="20000"/>
+          </a:bodyPr>
           <a:lstStyle/>
+          <a:p>
+            <a:pPr marL="114300" indent="0">
+              <a:buNone/>
+            </a:pPr>
+            <a:r>
+              <a:rPr lang="en-IN" dirty="0"/>
+              <a:t>PORTB &amp;= ~(1 &lt;&lt; PB2);</a:t>
+            </a:r>
+          </a:p>
+          <a:p>
+            <a:pPr marL="114300" indent="0">
+              <a:buNone/>
+            </a:pPr>
+            <a:r>
+              <a:rPr lang="en-IN" dirty="0"/>
+              <a:t>SPDR=OxD0|0x80; </a:t>
+            </a:r>
+          </a:p>
+          <a:p>
+            <a:pPr marL="114300" indent="0">
+              <a:buNone/>
+            </a:pPr>
+            <a:r>
+              <a:rPr lang="en-IN" dirty="0"/>
+              <a:t>while(!(SPSR &amp; (1 &lt;&lt; SPIF))); </a:t>
+            </a:r>
+          </a:p>
+          <a:p>
+            <a:pPr marL="114300" indent="0">
+              <a:buNone/>
+            </a:pPr>
+            <a:r>
+              <a:rPr lang="en-IN" dirty="0"/>
+              <a:t>Dummy = SPDR;</a:t>
+            </a:r>
+          </a:p>
+          <a:p>
+            <a:pPr marL="114300" indent="0">
+              <a:buNone/>
+            </a:pPr>
+            <a:r>
+              <a:rPr lang="en-IN" dirty="0"/>
+              <a:t>PORTB |= (1 &lt;&lt; PB2);</a:t>
+            </a:r>
+          </a:p>
+          <a:p>
+            <a:pPr marL="114300" indent="0">
+              <a:buNone/>
+            </a:pPr>
+            <a:endParaRPr lang="en-IN" dirty="0"/>
+          </a:p>
+          <a:p>
+            <a:pPr marL="114300" indent="0">
+              <a:buNone/>
+            </a:pPr>
+            <a:r>
+              <a:rPr lang="en-IN" dirty="0"/>
+              <a:t>PORTB &amp;= ~(1 &lt;&lt; PB2);</a:t>
+            </a:r>
+          </a:p>
+          <a:p>
+            <a:pPr marL="114300" indent="0">
+              <a:buNone/>
+            </a:pPr>
+            <a:r>
+              <a:rPr lang="en-IN" dirty="0"/>
+              <a:t>SPDR=Ox00; </a:t>
+            </a:r>
+          </a:p>
+          <a:p>
+            <a:pPr marL="114300" indent="0">
+              <a:buNone/>
+            </a:pPr>
+            <a:r>
+              <a:rPr lang="en-IN" dirty="0"/>
+              <a:t>while(!(SPSR &amp; (1 &lt;&lt; SPIF))); </a:t>
+            </a:r>
+          </a:p>
+          <a:p>
+            <a:pPr marL="114300" indent="0">
+              <a:buNone/>
+            </a:pPr>
+            <a:r>
+              <a:rPr lang="en-IN" dirty="0" err="1"/>
+              <a:t>Chip_id</a:t>
+            </a:r>
+            <a:r>
+              <a:rPr lang="en-IN" dirty="0"/>
+              <a:t> = SPDR;</a:t>
+            </a:r>
+          </a:p>
+          <a:p>
+            <a:pPr marL="114300" indent="0">
+              <a:buNone/>
+            </a:pPr>
+            <a:r>
+              <a:rPr lang="en-IN" dirty="0"/>
+              <a:t>PORTB |= (1 &lt;&lt; PB2);                  </a:t>
+            </a:r>
+          </a:p>
+          <a:p>
+            <a:pPr marL="114300" indent="0">
+              <a:buNone/>
+            </a:pPr>
+            <a:endParaRPr lang="en-IN" dirty="0"/>
+          </a:p>
+          <a:p>
+            <a:pPr marL="114300" indent="0">
+              <a:buNone/>
+            </a:pPr>
+            <a:r>
+              <a:rPr lang="en-IN" dirty="0"/>
+              <a:t>If(</a:t>
+            </a:r>
+            <a:r>
+              <a:rPr lang="en-IN" dirty="0" err="1"/>
+              <a:t>chip_id</a:t>
+            </a:r>
+            <a:r>
+              <a:rPr lang="en-IN" dirty="0"/>
+              <a:t>==0x58)</a:t>
+            </a:r>
+            <a:br>
+              <a:rPr lang="en-IN" dirty="0"/>
+            </a:br>
+            <a:r>
+              <a:rPr lang="en-IN" dirty="0"/>
+              <a:t>{</a:t>
+            </a:r>
+          </a:p>
+          <a:p>
+            <a:pPr marL="114300" indent="0">
+              <a:buNone/>
+            </a:pPr>
+            <a:r>
+              <a:rPr lang="en-IN" dirty="0"/>
+              <a:t>Led on code</a:t>
+            </a:r>
+            <a:br>
+              <a:rPr lang="en-IN" dirty="0"/>
+            </a:br>
+            <a:r>
+              <a:rPr lang="en-IN" dirty="0"/>
+              <a:t>}     </a:t>
+            </a:r>
+          </a:p>
+          <a:p>
+            <a:pPr marL="114300" indent="0">
+              <a:buNone/>
+            </a:pPr>
+            <a:r>
+              <a:rPr lang="en-IN" dirty="0"/>
+              <a:t>Else {</a:t>
+            </a:r>
+          </a:p>
+          <a:p>
+            <a:pPr marL="114300" indent="0">
+              <a:buNone/>
+            </a:pPr>
+            <a:r>
+              <a:rPr lang="en-IN"/>
+              <a:t>Led off </a:t>
+            </a:r>
+            <a:r>
+              <a:rPr lang="en-IN" dirty="0"/>
+              <a:t>code</a:t>
+            </a:r>
+          </a:p>
+          <a:p>
+            <a:pPr marL="114300" indent="0">
+              <a:buNone/>
+            </a:pPr>
+            <a:r>
+              <a:rPr lang="en-IN" dirty="0"/>
+              <a:t>}</a:t>
+            </a:r>
+          </a:p>
+          <a:p>
+            <a:pPr marL="114300" indent="0">
+              <a:buNone/>
+            </a:pPr>
+            <a:endParaRPr lang="en-IN" dirty="0"/>
+          </a:p>
+          <a:p>
+            <a:pPr marL="114300" indent="0">
+              <a:buNone/>
+            </a:pPr>
+            <a:endParaRPr lang="en-IN" dirty="0"/>
+          </a:p>
+          <a:p>
+            <a:pPr marL="114300" indent="0">
+              <a:buNone/>
+            </a:pPr>
+            <a:endParaRPr lang="en-IN" dirty="0"/>
+          </a:p>
+          <a:p>
+            <a:pPr marL="114300" indent="0">
+              <a:buNone/>
+            </a:pPr>
+            <a:endParaRPr lang="en-IN" dirty="0"/>
+          </a:p>
           <a:p>
             <a:pPr marL="114300" indent="0">
               <a:buNone/>

</xml_diff>